<commit_message>
Updates poster and WYSIWYG-Prototype
</commit_message>
<xml_diff>
--- a/ExpoPoster.pptx
+++ b/ExpoPoster.pptx
@@ -238,7 +238,7 @@
           <a:p>
             <a:fld id="{7395F848-6DDA-9042-95D4-0071278BB24B}" type="datetimeFigureOut">
               <a:rPr lang="en-US" smtClean="0"/>
-              <a:t>3/17/17</a:t>
+              <a:t>4/24/2017</a:t>
             </a:fld>
             <a:endParaRPr lang="en-US"/>
           </a:p>
@@ -302,38 +302,37 @@
           <a:p>
             <a:pPr lvl="0"/>
             <a:r>
-              <a:rPr lang="en-US" smtClean="0"/>
+              <a:rPr lang="en-US"/>
               <a:t>Click to edit Master text styles</a:t>
             </a:r>
           </a:p>
           <a:p>
             <a:pPr lvl="1"/>
             <a:r>
-              <a:rPr lang="en-US" smtClean="0"/>
+              <a:rPr lang="en-US"/>
               <a:t>Second level</a:t>
             </a:r>
           </a:p>
           <a:p>
             <a:pPr lvl="2"/>
             <a:r>
-              <a:rPr lang="en-US" smtClean="0"/>
+              <a:rPr lang="en-US"/>
               <a:t>Third level</a:t>
             </a:r>
           </a:p>
           <a:p>
             <a:pPr lvl="3"/>
             <a:r>
-              <a:rPr lang="en-US" smtClean="0"/>
+              <a:rPr lang="en-US"/>
               <a:t>Fourth level</a:t>
             </a:r>
           </a:p>
           <a:p>
             <a:pPr lvl="4"/>
             <a:r>
-              <a:rPr lang="en-US" smtClean="0"/>
+              <a:rPr lang="en-US"/>
               <a:t>Fifth level</a:t>
             </a:r>
-            <a:endParaRPr lang="en-US"/>
           </a:p>
         </p:txBody>
       </p:sp>
@@ -568,26 +567,26 @@
               <a:defRPr/>
             </a:pPr>
             <a:r>
-              <a:rPr lang="en-US" dirty="0" smtClean="0"/>
+              <a:rPr lang="en-US" dirty="0"/>
               <a:t>If tri-fold</a:t>
             </a:r>
             <a:r>
-              <a:rPr lang="en-US" baseline="0" dirty="0" smtClean="0"/>
+              <a:rPr lang="en-US" baseline="0" dirty="0"/>
               <a:t> mounting at SMS – make sure no text or image is in-between</a:t>
             </a:r>
             <a:r>
-              <a:rPr lang="en-US" dirty="0" smtClean="0"/>
+              <a:rPr lang="en-US" dirty="0"/>
               <a:t> the two vertical guide</a:t>
             </a:r>
             <a:r>
-              <a:rPr lang="en-US" baseline="0" dirty="0" smtClean="0"/>
+              <a:rPr lang="en-US" baseline="0" dirty="0"/>
               <a:t> lines; this space will be cut away. </a:t>
             </a:r>
             <a:r>
-              <a:rPr lang="en-US" baseline="0" smtClean="0"/>
+              <a:rPr lang="en-US" baseline="0"/>
               <a:t>To view the vertical guide lines: Select “View” from the main menu, select “Guides” from the pull down menu, and lastly select “Static Guides”.</a:t>
             </a:r>
-            <a:endParaRPr lang="en-US" smtClean="0"/>
+            <a:endParaRPr lang="en-US"/>
           </a:p>
           <a:p>
             <a:pPr marL="0" marR="0" indent="0" algn="l" defTabSz="457200" rtl="0" eaLnBrk="1" fontAlgn="auto" latinLnBrk="0" hangingPunct="1">
@@ -607,7 +606,7 @@
               <a:tabLst/>
               <a:defRPr/>
             </a:pPr>
-            <a:endParaRPr lang="en-US" smtClean="0"/>
+            <a:endParaRPr lang="en-US"/>
           </a:p>
           <a:p>
             <a:endParaRPr lang="en-US" dirty="0"/>
@@ -1005,14 +1004,14 @@
               </a:spcAft>
             </a:pPr>
             <a:r>
-              <a:rPr lang="en-US" sz="4000" b="1" dirty="0" smtClean="0">
+              <a:rPr lang="en-US" sz="4000" b="1" dirty="0">
                 <a:solidFill>
                   <a:schemeClr val="bg1"/>
                 </a:solidFill>
               </a:rPr>
               <a:t>COLLEGE OF ENGINEERING</a:t>
             </a:r>
-            <a:endParaRPr lang="en-US" sz="4000" dirty="0" smtClean="0">
+            <a:endParaRPr lang="en-US" sz="4000" dirty="0">
               <a:solidFill>
                 <a:schemeClr val="bg1"/>
               </a:solidFill>
@@ -1138,16 +1137,12 @@
               </a:spcAft>
             </a:pPr>
             <a:r>
-              <a:rPr lang="en-US" sz="4000" b="1" dirty="0" smtClean="0">
+              <a:rPr lang="en-US" sz="4000" b="1" dirty="0">
                 <a:latin typeface="Georgia"/>
                 <a:cs typeface="Georgia"/>
               </a:rPr>
               <a:t>Electrical Engineering &amp; Computer Science</a:t>
             </a:r>
-            <a:endParaRPr lang="en-US" sz="4000" b="1" dirty="0">
-              <a:latin typeface="Georgia"/>
-              <a:cs typeface="Georgia"/>
-            </a:endParaRPr>
           </a:p>
         </p:txBody>
       </p:sp>
@@ -1317,10 +1312,9 @@
           <a:lstStyle/>
           <a:p>
             <a:r>
-              <a:rPr lang="en-US" smtClean="0"/>
+              <a:rPr lang="en-US"/>
               <a:t>Click to edit Master title style</a:t>
             </a:r>
-            <a:endParaRPr lang="en-US"/>
           </a:p>
         </p:txBody>
       </p:sp>
@@ -1341,38 +1335,37 @@
           <a:p>
             <a:pPr lvl="0"/>
             <a:r>
-              <a:rPr lang="en-US" smtClean="0"/>
+              <a:rPr lang="en-US"/>
               <a:t>Click to edit Master text styles</a:t>
             </a:r>
           </a:p>
           <a:p>
             <a:pPr lvl="1"/>
             <a:r>
-              <a:rPr lang="en-US" smtClean="0"/>
+              <a:rPr lang="en-US"/>
               <a:t>Second level</a:t>
             </a:r>
           </a:p>
           <a:p>
             <a:pPr lvl="2"/>
             <a:r>
-              <a:rPr lang="en-US" smtClean="0"/>
+              <a:rPr lang="en-US"/>
               <a:t>Third level</a:t>
             </a:r>
           </a:p>
           <a:p>
             <a:pPr lvl="3"/>
             <a:r>
-              <a:rPr lang="en-US" smtClean="0"/>
+              <a:rPr lang="en-US"/>
               <a:t>Fourth level</a:t>
             </a:r>
           </a:p>
           <a:p>
             <a:pPr lvl="4"/>
             <a:r>
-              <a:rPr lang="en-US" smtClean="0"/>
+              <a:rPr lang="en-US"/>
               <a:t>Fifth level</a:t>
             </a:r>
-            <a:endParaRPr lang="en-US"/>
           </a:p>
         </p:txBody>
       </p:sp>
@@ -1393,7 +1386,7 @@
           <a:p>
             <a:fld id="{56B6BD69-149A-CD41-9E7C-E241C9398BA0}" type="datetimeFigureOut">
               <a:rPr lang="en-US" smtClean="0"/>
-              <a:t>3/17/17</a:t>
+              <a:t>4/24/2017</a:t>
             </a:fld>
             <a:endParaRPr lang="en-US"/>
           </a:p>
@@ -1492,10 +1485,9 @@
           <a:lstStyle/>
           <a:p>
             <a:r>
-              <a:rPr lang="en-US" smtClean="0"/>
+              <a:rPr lang="en-US"/>
               <a:t>Click to edit Master title style</a:t>
             </a:r>
-            <a:endParaRPr lang="en-US"/>
           </a:p>
         </p:txBody>
       </p:sp>
@@ -1521,38 +1513,37 @@
           <a:p>
             <a:pPr lvl="0"/>
             <a:r>
-              <a:rPr lang="en-US" smtClean="0"/>
+              <a:rPr lang="en-US"/>
               <a:t>Click to edit Master text styles</a:t>
             </a:r>
           </a:p>
           <a:p>
             <a:pPr lvl="1"/>
             <a:r>
-              <a:rPr lang="en-US" smtClean="0"/>
+              <a:rPr lang="en-US"/>
               <a:t>Second level</a:t>
             </a:r>
           </a:p>
           <a:p>
             <a:pPr lvl="2"/>
             <a:r>
-              <a:rPr lang="en-US" smtClean="0"/>
+              <a:rPr lang="en-US"/>
               <a:t>Third level</a:t>
             </a:r>
           </a:p>
           <a:p>
             <a:pPr lvl="3"/>
             <a:r>
-              <a:rPr lang="en-US" smtClean="0"/>
+              <a:rPr lang="en-US"/>
               <a:t>Fourth level</a:t>
             </a:r>
           </a:p>
           <a:p>
             <a:pPr lvl="4"/>
             <a:r>
-              <a:rPr lang="en-US" smtClean="0"/>
+              <a:rPr lang="en-US"/>
               <a:t>Fifth level</a:t>
             </a:r>
-            <a:endParaRPr lang="en-US"/>
           </a:p>
         </p:txBody>
       </p:sp>
@@ -1573,7 +1564,7 @@
           <a:p>
             <a:fld id="{56B6BD69-149A-CD41-9E7C-E241C9398BA0}" type="datetimeFigureOut">
               <a:rPr lang="en-US" smtClean="0"/>
-              <a:t>3/17/17</a:t>
+              <a:t>4/24/2017</a:t>
             </a:fld>
             <a:endParaRPr lang="en-US"/>
           </a:p>
@@ -1667,10 +1658,9 @@
           <a:lstStyle/>
           <a:p>
             <a:r>
-              <a:rPr lang="en-US" smtClean="0"/>
+              <a:rPr lang="en-US"/>
               <a:t>Click to edit Master title style</a:t>
             </a:r>
-            <a:endParaRPr lang="en-US"/>
           </a:p>
         </p:txBody>
       </p:sp>
@@ -1691,38 +1681,37 @@
           <a:p>
             <a:pPr lvl="0"/>
             <a:r>
-              <a:rPr lang="en-US" smtClean="0"/>
+              <a:rPr lang="en-US"/>
               <a:t>Click to edit Master text styles</a:t>
             </a:r>
           </a:p>
           <a:p>
             <a:pPr lvl="1"/>
             <a:r>
-              <a:rPr lang="en-US" smtClean="0"/>
+              <a:rPr lang="en-US"/>
               <a:t>Second level</a:t>
             </a:r>
           </a:p>
           <a:p>
             <a:pPr lvl="2"/>
             <a:r>
-              <a:rPr lang="en-US" smtClean="0"/>
+              <a:rPr lang="en-US"/>
               <a:t>Third level</a:t>
             </a:r>
           </a:p>
           <a:p>
             <a:pPr lvl="3"/>
             <a:r>
-              <a:rPr lang="en-US" smtClean="0"/>
+              <a:rPr lang="en-US"/>
               <a:t>Fourth level</a:t>
             </a:r>
           </a:p>
           <a:p>
             <a:pPr lvl="4"/>
             <a:r>
-              <a:rPr lang="en-US" smtClean="0"/>
+              <a:rPr lang="en-US"/>
               <a:t>Fifth level</a:t>
             </a:r>
-            <a:endParaRPr lang="en-US"/>
           </a:p>
         </p:txBody>
       </p:sp>
@@ -1743,7 +1732,7 @@
           <a:p>
             <a:fld id="{56B6BD69-149A-CD41-9E7C-E241C9398BA0}" type="datetimeFigureOut">
               <a:rPr lang="en-US" smtClean="0"/>
-              <a:t>3/17/17</a:t>
+              <a:t>4/24/2017</a:t>
             </a:fld>
             <a:endParaRPr lang="en-US"/>
           </a:p>
@@ -1846,10 +1835,9 @@
           </a:lstStyle>
           <a:p>
             <a:r>
-              <a:rPr lang="en-US" smtClean="0"/>
+              <a:rPr lang="en-US"/>
               <a:t>Click to edit Master title style</a:t>
             </a:r>
-            <a:endParaRPr lang="en-US"/>
           </a:p>
         </p:txBody>
       </p:sp>
@@ -1966,7 +1954,7 @@
           <a:p>
             <a:pPr lvl="0"/>
             <a:r>
-              <a:rPr lang="en-US" smtClean="0"/>
+              <a:rPr lang="en-US"/>
               <a:t>Click to edit Master text styles</a:t>
             </a:r>
           </a:p>
@@ -1989,7 +1977,7 @@
           <a:p>
             <a:fld id="{56B6BD69-149A-CD41-9E7C-E241C9398BA0}" type="datetimeFigureOut">
               <a:rPr lang="en-US" smtClean="0"/>
-              <a:t>3/17/17</a:t>
+              <a:t>4/24/2017</a:t>
             </a:fld>
             <a:endParaRPr lang="en-US"/>
           </a:p>
@@ -2083,10 +2071,9 @@
           <a:lstStyle/>
           <a:p>
             <a:r>
-              <a:rPr lang="en-US" smtClean="0"/>
+              <a:rPr lang="en-US"/>
               <a:t>Click to edit Master title style</a:t>
             </a:r>
-            <a:endParaRPr lang="en-US"/>
           </a:p>
         </p:txBody>
       </p:sp>
@@ -2140,38 +2127,37 @@
           <a:p>
             <a:pPr lvl="0"/>
             <a:r>
-              <a:rPr lang="en-US" smtClean="0"/>
+              <a:rPr lang="en-US"/>
               <a:t>Click to edit Master text styles</a:t>
             </a:r>
           </a:p>
           <a:p>
             <a:pPr lvl="1"/>
             <a:r>
-              <a:rPr lang="en-US" smtClean="0"/>
+              <a:rPr lang="en-US"/>
               <a:t>Second level</a:t>
             </a:r>
           </a:p>
           <a:p>
             <a:pPr lvl="2"/>
             <a:r>
-              <a:rPr lang="en-US" smtClean="0"/>
+              <a:rPr lang="en-US"/>
               <a:t>Third level</a:t>
             </a:r>
           </a:p>
           <a:p>
             <a:pPr lvl="3"/>
             <a:r>
-              <a:rPr lang="en-US" smtClean="0"/>
+              <a:rPr lang="en-US"/>
               <a:t>Fourth level</a:t>
             </a:r>
           </a:p>
           <a:p>
             <a:pPr lvl="4"/>
             <a:r>
-              <a:rPr lang="en-US" smtClean="0"/>
+              <a:rPr lang="en-US"/>
               <a:t>Fifth level</a:t>
             </a:r>
-            <a:endParaRPr lang="en-US"/>
           </a:p>
         </p:txBody>
       </p:sp>
@@ -2225,38 +2211,37 @@
           <a:p>
             <a:pPr lvl="0"/>
             <a:r>
-              <a:rPr lang="en-US" smtClean="0"/>
+              <a:rPr lang="en-US"/>
               <a:t>Click to edit Master text styles</a:t>
             </a:r>
           </a:p>
           <a:p>
             <a:pPr lvl="1"/>
             <a:r>
-              <a:rPr lang="en-US" smtClean="0"/>
+              <a:rPr lang="en-US"/>
               <a:t>Second level</a:t>
             </a:r>
           </a:p>
           <a:p>
             <a:pPr lvl="2"/>
             <a:r>
-              <a:rPr lang="en-US" smtClean="0"/>
+              <a:rPr lang="en-US"/>
               <a:t>Third level</a:t>
             </a:r>
           </a:p>
           <a:p>
             <a:pPr lvl="3"/>
             <a:r>
-              <a:rPr lang="en-US" smtClean="0"/>
+              <a:rPr lang="en-US"/>
               <a:t>Fourth level</a:t>
             </a:r>
           </a:p>
           <a:p>
             <a:pPr lvl="4"/>
             <a:r>
-              <a:rPr lang="en-US" smtClean="0"/>
+              <a:rPr lang="en-US"/>
               <a:t>Fifth level</a:t>
             </a:r>
-            <a:endParaRPr lang="en-US"/>
           </a:p>
         </p:txBody>
       </p:sp>
@@ -2277,7 +2262,7 @@
           <a:p>
             <a:fld id="{56B6BD69-149A-CD41-9E7C-E241C9398BA0}" type="datetimeFigureOut">
               <a:rPr lang="en-US" smtClean="0"/>
-              <a:t>3/17/17</a:t>
+              <a:t>4/24/2017</a:t>
             </a:fld>
             <a:endParaRPr lang="en-US"/>
           </a:p>
@@ -2380,10 +2365,9 @@
           </a:lstStyle>
           <a:p>
             <a:r>
-              <a:rPr lang="en-US" smtClean="0"/>
+              <a:rPr lang="en-US"/>
               <a:t>Click to edit Master title style</a:t>
             </a:r>
-            <a:endParaRPr lang="en-US"/>
           </a:p>
         </p:txBody>
       </p:sp>
@@ -2446,7 +2430,7 @@
           <a:p>
             <a:pPr lvl="0"/>
             <a:r>
-              <a:rPr lang="en-US" smtClean="0"/>
+              <a:rPr lang="en-US"/>
               <a:t>Click to edit Master text styles</a:t>
             </a:r>
           </a:p>
@@ -2502,38 +2486,37 @@
           <a:p>
             <a:pPr lvl="0"/>
             <a:r>
-              <a:rPr lang="en-US" smtClean="0"/>
+              <a:rPr lang="en-US"/>
               <a:t>Click to edit Master text styles</a:t>
             </a:r>
           </a:p>
           <a:p>
             <a:pPr lvl="1"/>
             <a:r>
-              <a:rPr lang="en-US" smtClean="0"/>
+              <a:rPr lang="en-US"/>
               <a:t>Second level</a:t>
             </a:r>
           </a:p>
           <a:p>
             <a:pPr lvl="2"/>
             <a:r>
-              <a:rPr lang="en-US" smtClean="0"/>
+              <a:rPr lang="en-US"/>
               <a:t>Third level</a:t>
             </a:r>
           </a:p>
           <a:p>
             <a:pPr lvl="3"/>
             <a:r>
-              <a:rPr lang="en-US" smtClean="0"/>
+              <a:rPr lang="en-US"/>
               <a:t>Fourth level</a:t>
             </a:r>
           </a:p>
           <a:p>
             <a:pPr lvl="4"/>
             <a:r>
-              <a:rPr lang="en-US" smtClean="0"/>
+              <a:rPr lang="en-US"/>
               <a:t>Fifth level</a:t>
             </a:r>
-            <a:endParaRPr lang="en-US"/>
           </a:p>
         </p:txBody>
       </p:sp>
@@ -2596,7 +2579,7 @@
           <a:p>
             <a:pPr lvl="0"/>
             <a:r>
-              <a:rPr lang="en-US" smtClean="0"/>
+              <a:rPr lang="en-US"/>
               <a:t>Click to edit Master text styles</a:t>
             </a:r>
           </a:p>
@@ -2652,38 +2635,37 @@
           <a:p>
             <a:pPr lvl="0"/>
             <a:r>
-              <a:rPr lang="en-US" smtClean="0"/>
+              <a:rPr lang="en-US"/>
               <a:t>Click to edit Master text styles</a:t>
             </a:r>
           </a:p>
           <a:p>
             <a:pPr lvl="1"/>
             <a:r>
-              <a:rPr lang="en-US" smtClean="0"/>
+              <a:rPr lang="en-US"/>
               <a:t>Second level</a:t>
             </a:r>
           </a:p>
           <a:p>
             <a:pPr lvl="2"/>
             <a:r>
-              <a:rPr lang="en-US" smtClean="0"/>
+              <a:rPr lang="en-US"/>
               <a:t>Third level</a:t>
             </a:r>
           </a:p>
           <a:p>
             <a:pPr lvl="3"/>
             <a:r>
-              <a:rPr lang="en-US" smtClean="0"/>
+              <a:rPr lang="en-US"/>
               <a:t>Fourth level</a:t>
             </a:r>
           </a:p>
           <a:p>
             <a:pPr lvl="4"/>
             <a:r>
-              <a:rPr lang="en-US" smtClean="0"/>
+              <a:rPr lang="en-US"/>
               <a:t>Fifth level</a:t>
             </a:r>
-            <a:endParaRPr lang="en-US"/>
           </a:p>
         </p:txBody>
       </p:sp>
@@ -2704,7 +2686,7 @@
           <a:p>
             <a:fld id="{56B6BD69-149A-CD41-9E7C-E241C9398BA0}" type="datetimeFigureOut">
               <a:rPr lang="en-US" smtClean="0"/>
-              <a:t>3/17/17</a:t>
+              <a:t>4/24/2017</a:t>
             </a:fld>
             <a:endParaRPr lang="en-US"/>
           </a:p>
@@ -2798,10 +2780,9 @@
           <a:lstStyle/>
           <a:p>
             <a:r>
-              <a:rPr lang="en-US" smtClean="0"/>
+              <a:rPr lang="en-US"/>
               <a:t>Click to edit Master title style</a:t>
             </a:r>
-            <a:endParaRPr lang="en-US"/>
           </a:p>
         </p:txBody>
       </p:sp>
@@ -2822,7 +2803,7 @@
           <a:p>
             <a:fld id="{56B6BD69-149A-CD41-9E7C-E241C9398BA0}" type="datetimeFigureOut">
               <a:rPr lang="en-US" smtClean="0"/>
-              <a:t>3/17/17</a:t>
+              <a:t>4/24/2017</a:t>
             </a:fld>
             <a:endParaRPr lang="en-US"/>
           </a:p>
@@ -2917,7 +2898,7 @@
           <a:p>
             <a:fld id="{56B6BD69-149A-CD41-9E7C-E241C9398BA0}" type="datetimeFigureOut">
               <a:rPr lang="en-US" smtClean="0"/>
-              <a:t>3/17/17</a:t>
+              <a:t>4/24/2017</a:t>
             </a:fld>
             <a:endParaRPr lang="en-US"/>
           </a:p>
@@ -3020,10 +3001,9 @@
           </a:lstStyle>
           <a:p>
             <a:r>
-              <a:rPr lang="en-US" smtClean="0"/>
+              <a:rPr lang="en-US"/>
               <a:t>Click to edit Master title style</a:t>
             </a:r>
-            <a:endParaRPr lang="en-US"/>
           </a:p>
         </p:txBody>
       </p:sp>
@@ -3077,38 +3057,37 @@
           <a:p>
             <a:pPr lvl="0"/>
             <a:r>
-              <a:rPr lang="en-US" smtClean="0"/>
+              <a:rPr lang="en-US"/>
               <a:t>Click to edit Master text styles</a:t>
             </a:r>
           </a:p>
           <a:p>
             <a:pPr lvl="1"/>
             <a:r>
-              <a:rPr lang="en-US" smtClean="0"/>
+              <a:rPr lang="en-US"/>
               <a:t>Second level</a:t>
             </a:r>
           </a:p>
           <a:p>
             <a:pPr lvl="2"/>
             <a:r>
-              <a:rPr lang="en-US" smtClean="0"/>
+              <a:rPr lang="en-US"/>
               <a:t>Third level</a:t>
             </a:r>
           </a:p>
           <a:p>
             <a:pPr lvl="3"/>
             <a:r>
-              <a:rPr lang="en-US" smtClean="0"/>
+              <a:rPr lang="en-US"/>
               <a:t>Fourth level</a:t>
             </a:r>
           </a:p>
           <a:p>
             <a:pPr lvl="4"/>
             <a:r>
-              <a:rPr lang="en-US" smtClean="0"/>
+              <a:rPr lang="en-US"/>
               <a:t>Fifth level</a:t>
             </a:r>
-            <a:endParaRPr lang="en-US"/>
           </a:p>
         </p:txBody>
       </p:sp>
@@ -3171,7 +3150,7 @@
           <a:p>
             <a:pPr lvl="0"/>
             <a:r>
-              <a:rPr lang="en-US" smtClean="0"/>
+              <a:rPr lang="en-US"/>
               <a:t>Click to edit Master text styles</a:t>
             </a:r>
           </a:p>
@@ -3194,7 +3173,7 @@
           <a:p>
             <a:fld id="{56B6BD69-149A-CD41-9E7C-E241C9398BA0}" type="datetimeFigureOut">
               <a:rPr lang="en-US" smtClean="0"/>
-              <a:t>3/17/17</a:t>
+              <a:t>4/24/2017</a:t>
             </a:fld>
             <a:endParaRPr lang="en-US"/>
           </a:p>
@@ -3297,10 +3276,9 @@
           </a:lstStyle>
           <a:p>
             <a:r>
-              <a:rPr lang="en-US" smtClean="0"/>
+              <a:rPr lang="en-US"/>
               <a:t>Click to edit Master title style</a:t>
             </a:r>
-            <a:endParaRPr lang="en-US"/>
           </a:p>
         </p:txBody>
       </p:sp>
@@ -3362,10 +3340,9 @@
           </a:lstStyle>
           <a:p>
             <a:r>
-              <a:rPr lang="en-US" smtClean="0"/>
+              <a:rPr lang="en-US"/>
               <a:t>Drag picture to placeholder or click icon to add</a:t>
             </a:r>
-            <a:endParaRPr lang="en-US"/>
           </a:p>
         </p:txBody>
       </p:sp>
@@ -3428,7 +3405,7 @@
           <a:p>
             <a:pPr lvl="0"/>
             <a:r>
-              <a:rPr lang="en-US" smtClean="0"/>
+              <a:rPr lang="en-US"/>
               <a:t>Click to edit Master text styles</a:t>
             </a:r>
           </a:p>
@@ -3451,7 +3428,7 @@
           <a:p>
             <a:fld id="{56B6BD69-149A-CD41-9E7C-E241C9398BA0}" type="datetimeFigureOut">
               <a:rPr lang="en-US" smtClean="0"/>
-              <a:t>3/17/17</a:t>
+              <a:t>4/24/2017</a:t>
             </a:fld>
             <a:endParaRPr lang="en-US"/>
           </a:p>
@@ -3560,10 +3537,9 @@
           <a:lstStyle/>
           <a:p>
             <a:r>
-              <a:rPr lang="en-US" smtClean="0"/>
+              <a:rPr lang="en-US"/>
               <a:t>Click to edit Master title style</a:t>
             </a:r>
-            <a:endParaRPr lang="en-US"/>
           </a:p>
         </p:txBody>
       </p:sp>
@@ -3594,35 +3570,35 @@
           <a:p>
             <a:pPr lvl="0"/>
             <a:r>
-              <a:rPr lang="en-US" smtClean="0"/>
+              <a:rPr lang="en-US"/>
               <a:t>Click to edit Master text styles</a:t>
             </a:r>
           </a:p>
           <a:p>
             <a:pPr lvl="1"/>
             <a:r>
-              <a:rPr lang="en-US" smtClean="0"/>
+              <a:rPr lang="en-US"/>
               <a:t>Second level</a:t>
             </a:r>
           </a:p>
           <a:p>
             <a:pPr lvl="2"/>
             <a:r>
-              <a:rPr lang="en-US" smtClean="0"/>
+              <a:rPr lang="en-US"/>
               <a:t>Third level</a:t>
             </a:r>
           </a:p>
           <a:p>
             <a:pPr lvl="3"/>
             <a:r>
-              <a:rPr lang="en-US" smtClean="0"/>
+              <a:rPr lang="en-US"/>
               <a:t>Fourth level</a:t>
             </a:r>
           </a:p>
           <a:p>
             <a:pPr lvl="4"/>
             <a:r>
-              <a:rPr lang="en-US" smtClean="0"/>
+              <a:rPr lang="en-US"/>
               <a:t>Fifth level</a:t>
             </a:r>
             <a:endParaRPr lang="en-US" dirty="0"/>
@@ -3664,7 +3640,7 @@
           <a:p>
             <a:fld id="{56B6BD69-149A-CD41-9E7C-E241C9398BA0}" type="datetimeFigureOut">
               <a:rPr lang="en-US" smtClean="0"/>
-              <a:t>3/17/17</a:t>
+              <a:t>4/24/2017</a:t>
             </a:fld>
             <a:endParaRPr lang="en-US"/>
           </a:p>
@@ -4039,148 +4015,46 @@
           <a:chExt cx="0" cy="0"/>
         </a:xfrm>
       </p:grpSpPr>
-      <p:sp>
-        <p:nvSpPr>
-          <p:cNvPr id="2" name="Title 1"/>
-          <p:cNvSpPr>
-            <a:spLocks noGrp="1"/>
-          </p:cNvSpPr>
-          <p:nvPr>
-            <p:ph type="ctrTitle" idx="4294967295"/>
-          </p:nvPr>
-        </p:nvSpPr>
+      <p:pic>
+        <p:nvPicPr>
+          <p:cNvPr id="7" name="Picture 6"/>
+          <p:cNvPicPr>
+            <a:picLocks noChangeAspect="1"/>
+          </p:cNvPicPr>
+          <p:nvPr/>
+        </p:nvPicPr>
+        <p:blipFill>
+          <a:blip r:embed="rId3">
+            <a:extLst>
+              <a:ext uri="{28A0092B-C50C-407E-A947-70E740481C1C}">
+                <a14:useLocalDpi xmlns:a14="http://schemas.microsoft.com/office/drawing/2010/main" val="0"/>
+              </a:ext>
+            </a:extLst>
+          </a:blip>
+          <a:stretch>
+            <a:fillRect/>
+          </a:stretch>
+        </p:blipFill>
         <p:spPr>
           <a:xfrm>
-            <a:off x="12469125" y="2483718"/>
-            <a:ext cx="18951755" cy="1365892"/>
-          </a:xfrm>
-        </p:spPr>
-        <p:txBody>
-          <a:bodyPr lIns="0" tIns="0" rIns="0" bIns="0">
-            <a:noAutofit/>
-          </a:bodyPr>
-          <a:lstStyle/>
-          <a:p>
-            <a:pPr algn="l"/>
-            <a:r>
-              <a:rPr lang="en-US" sz="7200" b="1" cap="all" dirty="0" err="1" smtClean="0"/>
-              <a:t>Tensorflow</a:t>
-            </a:r>
-            <a:r>
-              <a:rPr lang="en-US" sz="7200" b="1" cap="all" dirty="0" smtClean="0"/>
-              <a:t> </a:t>
-            </a:r>
-            <a:r>
-              <a:rPr lang="en-US" sz="7200" b="1" cap="all" dirty="0" err="1" smtClean="0"/>
-              <a:t>wysiWyg</a:t>
-            </a:r>
-            <a:r>
-              <a:rPr lang="en-US" sz="7200" b="1" cap="all" dirty="0" smtClean="0"/>
-              <a:t> graphical User-Interface CS Capstone Project</a:t>
-            </a:r>
-            <a:endParaRPr lang="en-US" sz="7200" b="1" cap="all" dirty="0"/>
-          </a:p>
-        </p:txBody>
-      </p:sp>
-      <p:sp>
-        <p:nvSpPr>
-          <p:cNvPr id="3" name="Subtitle 2"/>
-          <p:cNvSpPr>
-            <a:spLocks noGrp="1"/>
-          </p:cNvSpPr>
-          <p:nvPr>
-            <p:ph type="subTitle" idx="4294967295"/>
-          </p:nvPr>
-        </p:nvSpPr>
-        <p:spPr>
-          <a:xfrm>
-            <a:off x="12469125" y="4970637"/>
-            <a:ext cx="18951755" cy="1991672"/>
-          </a:xfrm>
-        </p:spPr>
-        <p:txBody>
-          <a:bodyPr lIns="0" tIns="0" rIns="0" bIns="0">
-            <a:normAutofit/>
-          </a:bodyPr>
-          <a:lstStyle/>
-          <a:p>
-            <a:pPr marL="0" indent="0" algn="l">
-              <a:buNone/>
-            </a:pPr>
-            <a:r>
-              <a:rPr lang="en-US" sz="5400" dirty="0" smtClean="0">
-                <a:solidFill>
-                  <a:srgbClr val="F37321"/>
-                </a:solidFill>
-              </a:rPr>
-              <a:t>Make Deep Learning Easier</a:t>
-            </a:r>
-            <a:endParaRPr lang="en-US" sz="5400" dirty="0">
-              <a:solidFill>
-                <a:srgbClr val="F37321"/>
-              </a:solidFill>
-            </a:endParaRPr>
-          </a:p>
-        </p:txBody>
-      </p:sp>
-      <p:sp>
-        <p:nvSpPr>
-          <p:cNvPr id="12" name="Rectangle 11"/>
-          <p:cNvSpPr/>
-          <p:nvPr/>
-        </p:nvSpPr>
-        <p:spPr>
-          <a:xfrm>
-            <a:off x="12390649" y="5966473"/>
-            <a:ext cx="9222475" cy="6047739"/>
+            <a:off x="396442" y="4126717"/>
+            <a:ext cx="10952495" cy="5125074"/>
           </a:xfrm>
           <a:prstGeom prst="rect">
             <a:avLst/>
           </a:prstGeom>
-          <a:solidFill>
-            <a:schemeClr val="accent2">
-              <a:lumMod val="20000"/>
-              <a:lumOff val="80000"/>
-            </a:schemeClr>
-          </a:solidFill>
-          <a:ln>
-            <a:noFill/>
-          </a:ln>
-          <a:effectLst/>
         </p:spPr>
-        <p:style>
-          <a:lnRef idx="1">
-            <a:schemeClr val="accent1"/>
-          </a:lnRef>
-          <a:fillRef idx="3">
-            <a:schemeClr val="accent1"/>
-          </a:fillRef>
-          <a:effectRef idx="2">
-            <a:schemeClr val="accent1"/>
-          </a:effectRef>
-          <a:fontRef idx="minor">
-            <a:schemeClr val="lt1"/>
-          </a:fontRef>
-        </p:style>
-        <p:txBody>
-          <a:bodyPr rtlCol="0" anchor="ctr"/>
-          <a:lstStyle/>
-          <a:p>
-            <a:pPr algn="ctr"/>
-            <a:endParaRPr lang="en-US"/>
-          </a:p>
-        </p:txBody>
-      </p:sp>
-      <p:sp>
-        <p:nvSpPr>
-          <p:cNvPr id="13" name="TextBox 12"/>
+      </p:pic>
+      <p:sp>
+        <p:nvSpPr>
+          <p:cNvPr id="9" name="TextBox 8"/>
           <p:cNvSpPr txBox="1"/>
           <p:nvPr/>
         </p:nvSpPr>
         <p:spPr>
           <a:xfrm>
-            <a:off x="12390650" y="13512799"/>
-            <a:ext cx="9222475" cy="17343309"/>
+            <a:off x="1561069" y="9327596"/>
+            <a:ext cx="9206228" cy="1077218"/>
           </a:xfrm>
           <a:prstGeom prst="rect">
             <a:avLst/>
@@ -4188,88 +4062,196 @@
           <a:noFill/>
         </p:spPr>
         <p:txBody>
+          <a:bodyPr wrap="square" rtlCol="0">
+            <a:spAutoFit/>
+          </a:bodyPr>
+          <a:lstStyle/>
+          <a:p>
+            <a:r>
+              <a:rPr lang="en-US" sz="3200" dirty="0"/>
+              <a:t>Figure 1: A diagram showing how a deep learning algorithm works. (Dean, 2015)</a:t>
+            </a:r>
+          </a:p>
+        </p:txBody>
+      </p:sp>
+      <p:sp>
+        <p:nvSpPr>
+          <p:cNvPr id="2" name="Title 1"/>
+          <p:cNvSpPr>
+            <a:spLocks noGrp="1"/>
+          </p:cNvSpPr>
+          <p:nvPr>
+            <p:ph type="ctrTitle" idx="4294967295"/>
+          </p:nvPr>
+        </p:nvSpPr>
+        <p:spPr>
+          <a:xfrm>
+            <a:off x="14216779" y="2707639"/>
+            <a:ext cx="16775589" cy="1365892"/>
+          </a:xfrm>
+        </p:spPr>
+        <p:txBody>
+          <a:bodyPr lIns="0" tIns="0" rIns="0" bIns="0">
+            <a:noAutofit/>
+          </a:bodyPr>
+          <a:lstStyle/>
+          <a:p>
+            <a:r>
+              <a:rPr lang="en-US" sz="7200" b="1" cap="all" dirty="0" err="1"/>
+              <a:t>Tensorflow</a:t>
+            </a:r>
+            <a:r>
+              <a:rPr lang="en-US" sz="7200" b="1" cap="all" dirty="0"/>
+              <a:t> </a:t>
+            </a:r>
+            <a:r>
+              <a:rPr lang="en-US" sz="7200" b="1" cap="all" dirty="0" err="1"/>
+              <a:t>wysiWyg</a:t>
+            </a:r>
+            <a:r>
+              <a:rPr lang="en-US" sz="7200" b="1" cap="all" dirty="0"/>
+              <a:t> graphical User-Interface</a:t>
+            </a:r>
+          </a:p>
+        </p:txBody>
+      </p:sp>
+      <p:sp>
+        <p:nvSpPr>
+          <p:cNvPr id="3" name="Subtitle 2"/>
+          <p:cNvSpPr>
+            <a:spLocks noGrp="1"/>
+          </p:cNvSpPr>
+          <p:nvPr>
+            <p:ph type="subTitle" idx="4294967295"/>
+          </p:nvPr>
+        </p:nvSpPr>
+        <p:spPr>
+          <a:xfrm>
+            <a:off x="1561068" y="2849487"/>
+            <a:ext cx="8823903" cy="1201425"/>
+          </a:xfrm>
+        </p:spPr>
+        <p:txBody>
+          <a:bodyPr lIns="0" tIns="0" rIns="0" bIns="0">
+            <a:normAutofit/>
+          </a:bodyPr>
+          <a:lstStyle/>
+          <a:p>
+            <a:pPr marL="0" indent="0" algn="ctr">
+              <a:buNone/>
+            </a:pPr>
+            <a:r>
+              <a:rPr lang="en-US" sz="5400" dirty="0">
+                <a:solidFill>
+                  <a:srgbClr val="F37321"/>
+                </a:solidFill>
+              </a:rPr>
+              <a:t>Make Deep Learning Easier</a:t>
+            </a:r>
+          </a:p>
+        </p:txBody>
+      </p:sp>
+      <p:sp>
+        <p:nvSpPr>
+          <p:cNvPr id="13" name="TextBox 12"/>
+          <p:cNvSpPr txBox="1"/>
+          <p:nvPr/>
+        </p:nvSpPr>
+        <p:spPr>
+          <a:xfrm>
+            <a:off x="22454763" y="14851253"/>
+            <a:ext cx="8593457" cy="16434289"/>
+          </a:xfrm>
+          <a:prstGeom prst="rect">
+            <a:avLst/>
+          </a:prstGeom>
+          <a:noFill/>
+        </p:spPr>
+        <p:txBody>
           <a:bodyPr wrap="square" rtlCol="0" anchor="t" anchorCtr="0">
             <a:noAutofit/>
           </a:bodyPr>
           <a:lstStyle/>
           <a:p>
             <a:pPr>
+              <a:spcBef>
+                <a:spcPts val="600"/>
+              </a:spcBef>
               <a:spcAft>
-                <a:spcPts val="1800"/>
+                <a:spcPts val="600"/>
               </a:spcAft>
             </a:pPr>
             <a:r>
-              <a:rPr lang="en-US" sz="3600" b="1" dirty="0" smtClean="0">
+              <a:rPr lang="en-US" sz="3600" b="1" dirty="0">
                 <a:solidFill>
                   <a:srgbClr val="5D87A1"/>
                 </a:solidFill>
               </a:rPr>
-              <a:t>The Design:</a:t>
-            </a:r>
-            <a:endParaRPr lang="en-US" sz="3600" b="1" dirty="0">
-              <a:solidFill>
-                <a:srgbClr val="5D87A1"/>
-              </a:solidFill>
-            </a:endParaRPr>
-          </a:p>
-          <a:p>
+              <a:t>What are we making?</a:t>
+            </a:r>
+          </a:p>
+          <a:p>
+            <a:pPr>
+              <a:spcBef>
+                <a:spcPts val="600"/>
+              </a:spcBef>
+              <a:spcAft>
+                <a:spcPts val="600"/>
+              </a:spcAft>
+            </a:pPr>
             <a:r>
               <a:rPr lang="en-US" sz="3600" dirty="0"/>
-              <a:t>Display the build space in a graphical user interface. This display is called the Scene. </a:t>
-            </a:r>
-          </a:p>
-          <a:p>
+              <a:t>We are making a Graphical user interface-based programming environment. The task of this tool is to convert a program design generated by the user using our interface into Python code. </a:t>
+            </a:r>
+          </a:p>
+          <a:p>
+            <a:pPr>
+              <a:spcBef>
+                <a:spcPts val="600"/>
+              </a:spcBef>
+              <a:spcAft>
+                <a:spcPts val="600"/>
+              </a:spcAft>
+            </a:pPr>
+            <a:endParaRPr lang="en-US" sz="3600" dirty="0"/>
+          </a:p>
+          <a:p>
+            <a:pPr>
+              <a:spcBef>
+                <a:spcPts val="600"/>
+              </a:spcBef>
+              <a:spcAft>
+                <a:spcPts val="600"/>
+              </a:spcAft>
+            </a:pPr>
             <a:r>
               <a:rPr lang="en-US" sz="3600" dirty="0"/>
-              <a:t>Represent variables as blocks. These blocks contain data. </a:t>
-            </a:r>
-          </a:p>
-          <a:p>
+              <a:t>Our proposed solution is to use the Python scripting language to develop a software that grants developers the ability to visualize the control flow of their program using a flowchart style design.</a:t>
+            </a:r>
+          </a:p>
+          <a:p>
+            <a:pPr>
+              <a:spcBef>
+                <a:spcPts val="600"/>
+              </a:spcBef>
+              <a:spcAft>
+                <a:spcPts val="600"/>
+              </a:spcAft>
+            </a:pPr>
+            <a:endParaRPr lang="en-US" sz="3600" dirty="0"/>
+          </a:p>
+          <a:p>
+            <a:pPr>
+              <a:spcBef>
+                <a:spcPts val="600"/>
+              </a:spcBef>
+              <a:spcAft>
+                <a:spcPts val="600"/>
+              </a:spcAft>
+            </a:pPr>
             <a:r>
               <a:rPr lang="en-US" sz="3600" dirty="0"/>
-              <a:t>Represent methods as blocks. These blocks can be rotated in order to help with readability. Furthermore, you can adjust the visual size of this block. </a:t>
-            </a:r>
-          </a:p>
-          <a:p>
-            <a:r>
-              <a:rPr lang="en-US" sz="3600" dirty="0"/>
-              <a:t>Represent classes as blocks. Classes can contain multiple method and variable blocks and could be abstracted away. when a class is abstracted, it is represented as a new block that hides its members. </a:t>
-            </a:r>
-          </a:p>
-          <a:p>
-            <a:r>
-              <a:rPr lang="en-US" sz="3600" dirty="0"/>
-              <a:t>Represent layers as pages. Layers can contain multiple classes, however, each layer is independent of other layers</a:t>
-            </a:r>
-            <a:r>
-              <a:rPr lang="en-US" sz="3600" dirty="0" smtClean="0"/>
-              <a:t>.</a:t>
-            </a:r>
-          </a:p>
-          <a:p>
-            <a:endParaRPr lang="en-US" sz="3600" dirty="0"/>
-          </a:p>
-          <a:p>
-            <a:r>
-              <a:rPr lang="en-US" sz="3600" dirty="0"/>
-              <a:t>Represent channels as vectors. A channel is a connection between an input and an output that describes how data flows between method blocks</a:t>
-            </a:r>
-            <a:r>
-              <a:rPr lang="en-US" sz="3600" dirty="0" smtClean="0"/>
-              <a:t>.</a:t>
-            </a:r>
-          </a:p>
-          <a:p>
-            <a:r>
-              <a:rPr lang="en-US" sz="3600" dirty="0" smtClean="0"/>
-              <a:t> </a:t>
-            </a:r>
-            <a:endParaRPr lang="en-US" sz="3600" dirty="0"/>
-          </a:p>
-          <a:p>
-            <a:r>
-              <a:rPr lang="en-US" sz="3600" dirty="0"/>
-              <a:t>Probe blocks that display what is being passed through channels. This probe can modify the data that is going through a channel while the program is running. </a:t>
+              <a:t>The idea behind this comes from the analogy of a factory pipeline where each and every module (or in this case function) performs a task on the output of the previous module or function in order to generate the desired product. At each module the data is scrutinized and filtered to the next until the final module completes the pipeline and outputs the desired or expected value.</a:t>
             </a:r>
           </a:p>
           <a:p>
@@ -4294,8 +4276,8 @@
         </p:nvSpPr>
         <p:spPr>
           <a:xfrm>
-            <a:off x="22198405" y="5966473"/>
-            <a:ext cx="9222475" cy="12979388"/>
+            <a:off x="1740028" y="11009747"/>
+            <a:ext cx="9222475" cy="8732146"/>
           </a:xfrm>
           <a:prstGeom prst="rect">
             <a:avLst/>
@@ -4314,103 +4296,29 @@
               </a:spcAft>
             </a:pPr>
             <a:r>
-              <a:rPr lang="en-US" sz="3600" b="1" dirty="0" smtClean="0">
+              <a:rPr lang="en-US" sz="3600" b="1" dirty="0">
                 <a:solidFill>
                   <a:srgbClr val="5D87A1"/>
                 </a:solidFill>
               </a:rPr>
-              <a:t>Design (cont.):</a:t>
-            </a:r>
+              <a:t>What is Deep Learning?</a:t>
+            </a:r>
+            <a:endParaRPr lang="en-US" sz="3600" dirty="0"/>
           </a:p>
           <a:p>
             <a:r>
               <a:rPr lang="en-US" sz="3600" dirty="0"/>
-              <a:t>Probes can also assert certain values causing the execution to stop if a certain assertion is violated. </a:t>
-            </a:r>
+              <a:t>Deep Learning is a field of study related to Artificial Intelligence which allows us to estimate the probability of occurrence of a certain pattern given the data of an event.</a:t>
+            </a:r>
+          </a:p>
+          <a:p>
+            <a:endParaRPr lang="en-US" sz="3600" dirty="0"/>
           </a:p>
           <a:p>
             <a:r>
               <a:rPr lang="en-US" sz="3600" dirty="0"/>
-              <a:t>Represent outputs as blocks. This block represents the final outcome. This block also ends the program execution. </a:t>
-            </a:r>
-            <a:endParaRPr lang="en-US" sz="3600" dirty="0" smtClean="0"/>
-          </a:p>
-          <a:p>
-            <a:endParaRPr lang="en-US" sz="3600" dirty="0"/>
-          </a:p>
-          <a:p>
-            <a:r>
-              <a:rPr lang="en-US" sz="3600" dirty="0"/>
-              <a:t>Extract function outputs the corresponding Python file based on the designed system. </a:t>
-            </a:r>
-          </a:p>
-          <a:p>
-            <a:r>
-              <a:rPr lang="en-US" sz="3600" dirty="0"/>
-              <a:t>Blocks menu window. This window contains a list of all blocks including layers, classes, methods, variables and probes. </a:t>
-            </a:r>
-          </a:p>
-          <a:p>
-            <a:r>
-              <a:rPr lang="en-US" sz="3600" dirty="0"/>
-              <a:t>Drag and drop functionality. The user should be able to drag and drop blocks from the block menu to the Scene.</a:t>
-            </a:r>
-            <a:endParaRPr lang="en-US" sz="3600" b="1" dirty="0" smtClean="0">
-              <a:solidFill>
-                <a:srgbClr val="5D87A1"/>
-              </a:solidFill>
-            </a:endParaRPr>
-          </a:p>
-          <a:p>
-            <a:endParaRPr lang="en-US" sz="3600" dirty="0"/>
-          </a:p>
-        </p:txBody>
-      </p:sp>
-      <p:sp>
-        <p:nvSpPr>
-          <p:cNvPr id="24" name="Rectangle 23"/>
-          <p:cNvSpPr/>
-          <p:nvPr/>
-        </p:nvSpPr>
-        <p:spPr>
-          <a:xfrm>
-            <a:off x="1406151" y="21912943"/>
-            <a:ext cx="8550648" cy="9089455"/>
-          </a:xfrm>
-          <a:prstGeom prst="rect">
-            <a:avLst/>
-          </a:prstGeom>
-          <a:solidFill>
-            <a:schemeClr val="accent2">
-              <a:lumMod val="20000"/>
-              <a:lumOff val="80000"/>
-            </a:schemeClr>
-          </a:solidFill>
-          <a:ln>
-            <a:noFill/>
-          </a:ln>
-          <a:effectLst/>
-        </p:spPr>
-        <p:style>
-          <a:lnRef idx="1">
-            <a:schemeClr val="accent1"/>
-          </a:lnRef>
-          <a:fillRef idx="3">
-            <a:schemeClr val="accent1"/>
-          </a:fillRef>
-          <a:effectRef idx="2">
-            <a:schemeClr val="accent1"/>
-          </a:effectRef>
-          <a:fontRef idx="minor">
-            <a:schemeClr val="lt1"/>
-          </a:fontRef>
-        </p:style>
-        <p:txBody>
-          <a:bodyPr rtlCol="0" anchor="ctr"/>
-          <a:lstStyle/>
-          <a:p>
-            <a:pPr algn="ctr"/>
-            <a:endParaRPr lang="en-US"/>
+              <a:t>In other words, Deep Learning allows computers to study given information to make a calculated estimate or educated guess that allows them to perform tasks like decision making from large sets of data like images or other gathered sensory information</a:t>
+            </a:r>
           </a:p>
         </p:txBody>
       </p:sp>
@@ -4422,8 +4330,8 @@
         </p:nvSpPr>
         <p:spPr>
           <a:xfrm>
-            <a:off x="1406151" y="5331461"/>
-            <a:ext cx="8550648" cy="18962798"/>
+            <a:off x="1740028" y="19316163"/>
+            <a:ext cx="9027268" cy="25757538"/>
           </a:xfrm>
           <a:prstGeom prst="rect">
             <a:avLst/>
@@ -4442,118 +4350,88 @@
               </a:spcAft>
             </a:pPr>
             <a:r>
-              <a:rPr lang="en-US" sz="3600" b="1" dirty="0" smtClean="0">
+              <a:rPr lang="en-US" sz="3600" b="1" dirty="0">
                 <a:solidFill>
                   <a:srgbClr val="5D87A1"/>
                 </a:solidFill>
               </a:rPr>
-              <a:t>Problem</a:t>
-            </a:r>
-            <a:endParaRPr lang="en-US" sz="3600" b="1" dirty="0">
-              <a:solidFill>
-                <a:srgbClr val="5D87A1"/>
-              </a:solidFill>
-            </a:endParaRPr>
-          </a:p>
-          <a:p>
-            <a:r>
-              <a:rPr lang="en-US" sz="3200" dirty="0"/>
-              <a:t>Software that allows individuals to visualize the step-by-step process of computer programming has greatly assisted aspiring programmers and experienced professionals. </a:t>
-            </a:r>
-            <a:endParaRPr lang="en-US" sz="3200" dirty="0" smtClean="0"/>
-          </a:p>
-          <a:p>
-            <a:endParaRPr lang="en-US" sz="3200" dirty="0"/>
-          </a:p>
-          <a:p>
-            <a:r>
-              <a:rPr lang="en-US" sz="3200" dirty="0" smtClean="0"/>
-              <a:t>Tools </a:t>
-            </a:r>
-            <a:r>
-              <a:rPr lang="en-US" sz="3200" dirty="0"/>
-              <a:t>that aid individuals in programming software exist for both educational and commercial purposes, but there is a lack of visualization software targeted specifically at the subject of machine learning. </a:t>
-            </a:r>
-            <a:endParaRPr lang="en-US" sz="3200" dirty="0" smtClean="0"/>
-          </a:p>
-          <a:p>
-            <a:endParaRPr lang="en-US" sz="3200" dirty="0"/>
-          </a:p>
-          <a:p>
-            <a:r>
-              <a:rPr lang="en-US" sz="3200" dirty="0" err="1" smtClean="0"/>
-              <a:t>TensorFlow</a:t>
-            </a:r>
-            <a:r>
-              <a:rPr lang="en-US" sz="3200" dirty="0" smtClean="0"/>
-              <a:t> </a:t>
-            </a:r>
-            <a:r>
-              <a:rPr lang="en-US" sz="3200" dirty="0"/>
-              <a:t>is a machine learning API (Application Program Interface) developed by Google in order to provide an optimized machine learning toolset for developers. </a:t>
-            </a:r>
-            <a:endParaRPr lang="en-US" sz="3200" dirty="0" smtClean="0"/>
-          </a:p>
-          <a:p>
-            <a:endParaRPr lang="en-US" sz="3200" dirty="0"/>
-          </a:p>
-          <a:p>
-            <a:r>
-              <a:rPr lang="en-US" sz="3200" dirty="0" smtClean="0"/>
-              <a:t>Despite </a:t>
-            </a:r>
-            <a:r>
-              <a:rPr lang="en-US" sz="3200" dirty="0" err="1"/>
-              <a:t>TensorFlow</a:t>
-            </a:r>
-            <a:r>
-              <a:rPr lang="en-US" sz="3200" dirty="0"/>
-              <a:t> having useful applications and a rich manual it does not have an eloquent way to interact with visualization of the software for its users. </a:t>
-            </a:r>
-            <a:endParaRPr lang="en-US" sz="3200" dirty="0" smtClean="0"/>
-          </a:p>
-          <a:p>
-            <a:endParaRPr lang="en-US" sz="3600" b="1" dirty="0" smtClean="0">
-              <a:solidFill>
-                <a:srgbClr val="5D87A1"/>
-              </a:solidFill>
-            </a:endParaRPr>
-          </a:p>
-          <a:p>
-            <a:pPr>
+              <a:t>What problem are we trying solve? </a:t>
+            </a:r>
+          </a:p>
+          <a:p>
+            <a:pPr marL="571500" indent="-571500">
               <a:spcAft>
                 <a:spcPts val="1800"/>
               </a:spcAft>
+              <a:buFont typeface="Arial" panose="020B0604020202020204" pitchFamily="34" charset="0"/>
+              <a:buChar char="•"/>
             </a:pPr>
             <a:r>
-              <a:rPr lang="en-US" sz="3600" b="1" dirty="0" smtClean="0">
-                <a:solidFill>
-                  <a:srgbClr val="5D87A1"/>
-                </a:solidFill>
-              </a:rPr>
-              <a:t>Proposed Solution</a:t>
-            </a:r>
-          </a:p>
-          <a:p>
-            <a:pPr>
+              <a:rPr lang="en-US" sz="3600" dirty="0"/>
+              <a:t>Software that allows individuals to visualize the step-by-step process of computer programming has greatly assisted aspiring programmers and experienced professionals. </a:t>
+            </a:r>
+          </a:p>
+          <a:p>
+            <a:pPr marL="571500" indent="-571500">
               <a:spcAft>
                 <a:spcPts val="1800"/>
               </a:spcAft>
+              <a:buFont typeface="Arial" panose="020B0604020202020204" pitchFamily="34" charset="0"/>
+              <a:buChar char="•"/>
             </a:pPr>
-            <a:r>
-              <a:rPr lang="en-US" sz="3600" dirty="0"/>
-              <a:t>Our proposed solution is to use the Python scripting language to develop a software that grants developers the ability to graphically visualize the control flow of their program using a flowchart style </a:t>
-            </a:r>
-            <a:r>
-              <a:rPr lang="en-US" sz="3600" dirty="0" smtClean="0"/>
-              <a:t>design.</a:t>
-            </a:r>
-          </a:p>
-          <a:p>
-            <a:pPr>
+            <a:endParaRPr lang="en-US" sz="3600" dirty="0"/>
+          </a:p>
+          <a:p>
+            <a:pPr marL="571500" indent="-571500">
               <a:spcAft>
                 <a:spcPts val="1800"/>
               </a:spcAft>
+              <a:buFont typeface="Arial" panose="020B0604020202020204" pitchFamily="34" charset="0"/>
+              <a:buChar char="•"/>
+            </a:pPr>
+            <a:r>
+              <a:rPr lang="en-US" sz="3600" dirty="0"/>
+              <a:t>Tools that aid individuals in programming software exist for both educational and commercial purposes, but there is a lack of visualization software targeted specifically at the subject of machine learning. </a:t>
+            </a:r>
+          </a:p>
+          <a:p>
+            <a:pPr marL="571500" indent="-571500">
+              <a:spcAft>
+                <a:spcPts val="1800"/>
+              </a:spcAft>
+              <a:buFont typeface="Arial" panose="020B0604020202020204" pitchFamily="34" charset="0"/>
+              <a:buChar char="•"/>
+            </a:pPr>
+            <a:endParaRPr lang="en-US" sz="3600" dirty="0"/>
+          </a:p>
+          <a:p>
+            <a:pPr marL="571500" indent="-571500">
+              <a:spcAft>
+                <a:spcPts val="1800"/>
+              </a:spcAft>
+              <a:buFont typeface="Arial" panose="020B0604020202020204" pitchFamily="34" charset="0"/>
+              <a:buChar char="•"/>
+            </a:pPr>
+            <a:r>
+              <a:rPr lang="en-US" sz="3600" dirty="0"/>
+              <a:t>We want to create a software that supports </a:t>
+            </a:r>
+            <a:r>
+              <a:rPr lang="en-US" sz="3600" dirty="0" err="1"/>
+              <a:t>TensorFlow</a:t>
+            </a:r>
+            <a:r>
+              <a:rPr lang="en-US" sz="3600" dirty="0"/>
+              <a:t> to aid developers, researchers, and students with deep learning algorithm design.</a:t>
+            </a:r>
+          </a:p>
+          <a:p>
+            <a:pPr marL="571500" indent="-571500">
+              <a:spcAft>
+                <a:spcPts val="1800"/>
+              </a:spcAft>
+              <a:buFont typeface="Arial" panose="020B0604020202020204" pitchFamily="34" charset="0"/>
+              <a:buChar char="•"/>
             </a:pPr>
             <a:endParaRPr lang="en-US" sz="3600" b="1" dirty="0">
               <a:solidFill>
@@ -4573,7 +4451,7 @@
         </p:nvSpPr>
         <p:spPr>
           <a:xfrm>
-            <a:off x="1406151" y="3390585"/>
+            <a:off x="13840564" y="5865961"/>
             <a:ext cx="8550648" cy="1071162"/>
           </a:xfrm>
           <a:prstGeom prst="rect">
@@ -4742,18 +4620,13 @@
           <a:p>
             <a:pPr algn="l"/>
             <a:r>
-              <a:rPr lang="en-US" sz="5400" dirty="0" smtClean="0">
+              <a:rPr lang="en-US" sz="5400" dirty="0">
                 <a:solidFill>
                   <a:srgbClr val="F37321"/>
                 </a:solidFill>
               </a:rPr>
-              <a:t>Project Goal</a:t>
-            </a:r>
-            <a:endParaRPr lang="en-US" sz="5400" dirty="0">
-              <a:solidFill>
-                <a:srgbClr val="F37321"/>
-              </a:solidFill>
-            </a:endParaRPr>
+              <a:t>Project Prototype</a:t>
+            </a:r>
           </a:p>
         </p:txBody>
       </p:sp>
@@ -4765,7 +4638,7 @@
         </p:nvSpPr>
         <p:spPr>
           <a:xfrm>
-            <a:off x="34493200" y="5331461"/>
+            <a:off x="34493199" y="3994010"/>
             <a:ext cx="7827420" cy="6682751"/>
           </a:xfrm>
           <a:prstGeom prst="rect">
@@ -4815,7 +4688,7 @@
         </p:nvSpPr>
         <p:spPr>
           <a:xfrm>
-            <a:off x="34493200" y="2626822"/>
+            <a:off x="34493200" y="1904301"/>
             <a:ext cx="7827420" cy="2146611"/>
           </a:xfrm>
           <a:prstGeom prst="rect">
@@ -4983,28 +4856,23 @@
           </a:lstStyle>
           <a:p>
             <a:pPr algn="l"/>
-            <a:endParaRPr lang="en-US" sz="5400" dirty="0" smtClean="0">
-              <a:solidFill>
-                <a:schemeClr val="bg1"/>
-              </a:solidFill>
-            </a:endParaRPr>
-          </a:p>
-          <a:p>
-            <a:pPr algn="l"/>
-            <a:r>
-              <a:rPr lang="en-US" sz="5400" dirty="0" smtClean="0">
-                <a:solidFill>
-                  <a:schemeClr val="bg1"/>
-                </a:solidFill>
-              </a:rPr>
-              <a:t>Meet the team!</a:t>
-            </a:r>
             <a:endParaRPr lang="en-US" sz="5400" dirty="0">
               <a:solidFill>
                 <a:schemeClr val="bg1"/>
               </a:solidFill>
             </a:endParaRPr>
           </a:p>
+          <a:p>
+            <a:pPr algn="l"/>
+            <a:r>
+              <a:rPr lang="en-US" sz="5400" dirty="0">
+                <a:solidFill>
+                  <a:schemeClr val="bg1"/>
+                </a:solidFill>
+              </a:rPr>
+              <a:t>Meet the team!</a:t>
+            </a:r>
+          </a:p>
         </p:txBody>
       </p:sp>
       <p:sp>
@@ -5015,7 +4883,7 @@
         </p:nvSpPr>
         <p:spPr>
           <a:xfrm>
-            <a:off x="34493201" y="12674612"/>
+            <a:off x="34493199" y="11111359"/>
             <a:ext cx="7827420" cy="10602831"/>
           </a:xfrm>
           <a:prstGeom prst="rect">
@@ -5035,18 +4903,13 @@
               </a:spcAft>
             </a:pPr>
             <a:r>
-              <a:rPr lang="en-US" sz="3600" b="1" dirty="0" smtClean="0">
+              <a:rPr lang="en-US" sz="3600" b="1" dirty="0">
                 <a:solidFill>
                   <a:srgbClr val="F37321"/>
                 </a:solidFill>
               </a:rPr>
               <a:t>Team Members:</a:t>
             </a:r>
-            <a:endParaRPr lang="en-US" sz="3600" b="1" dirty="0" smtClean="0">
-              <a:solidFill>
-                <a:srgbClr val="F37321"/>
-              </a:solidFill>
-            </a:endParaRPr>
           </a:p>
           <a:p>
             <a:pPr marL="457200" indent="-457200">
@@ -5057,20 +4920,12 @@
               <a:buChar char="•"/>
             </a:pPr>
             <a:r>
-              <a:rPr lang="en-US" sz="3500" dirty="0" smtClean="0">
+              <a:rPr lang="en-US" sz="3500" dirty="0">
                 <a:solidFill>
                   <a:schemeClr val="bg1"/>
                 </a:solidFill>
               </a:rPr>
-              <a:t>Connor Sedwi</a:t>
-            </a:r>
-            <a:r>
-              <a:rPr lang="en-US" sz="3500" dirty="0" smtClean="0">
-                <a:solidFill>
-                  <a:schemeClr val="bg1"/>
-                </a:solidFill>
-              </a:rPr>
-              <a:t>ck </a:t>
+              <a:t>Connor Sedwick </a:t>
             </a:r>
           </a:p>
           <a:p>
@@ -5080,7 +4935,7 @@
               </a:spcAft>
             </a:pPr>
             <a:r>
-              <a:rPr lang="en-US" sz="3000" dirty="0" smtClean="0">
+              <a:rPr lang="en-US" sz="3000" dirty="0">
                 <a:solidFill>
                   <a:schemeClr val="bg1"/>
                 </a:solidFill>
@@ -5095,7 +4950,7 @@
               </a:spcAft>
             </a:pPr>
             <a:r>
-              <a:rPr lang="en-US" sz="3000" dirty="0" smtClean="0">
+              <a:rPr lang="en-US" sz="3000" dirty="0">
                 <a:solidFill>
                   <a:schemeClr val="bg1"/>
                 </a:solidFill>
@@ -5103,7 +4958,7 @@
               <a:t>    (</a:t>
             </a:r>
             <a:r>
-              <a:rPr lang="en-US" sz="3000" dirty="0" err="1" smtClean="0">
+              <a:rPr lang="en-US" sz="3000" dirty="0" err="1">
                 <a:solidFill>
                   <a:schemeClr val="bg1"/>
                 </a:solidFill>
@@ -5111,7 +4966,7 @@
               <a:t>sedwickc@oregonstate.edu</a:t>
             </a:r>
             <a:r>
-              <a:rPr lang="en-US" sz="3000" dirty="0" smtClean="0">
+              <a:rPr lang="en-US" sz="3000" dirty="0">
                 <a:solidFill>
                   <a:schemeClr val="bg1"/>
                 </a:solidFill>
@@ -5127,7 +4982,7 @@
               <a:buFont typeface="Arial"/>
               <a:buChar char="•"/>
             </a:pPr>
-            <a:endParaRPr lang="en-US" sz="3000" dirty="0" smtClean="0">
+            <a:endParaRPr lang="en-US" sz="3000" dirty="0">
               <a:solidFill>
                 <a:schemeClr val="bg1"/>
               </a:solidFill>
@@ -5142,7 +4997,7 @@
               <a:buChar char="•"/>
             </a:pPr>
             <a:r>
-              <a:rPr lang="en-US" sz="3500" dirty="0" smtClean="0">
+              <a:rPr lang="en-US" sz="3500" dirty="0">
                 <a:solidFill>
                   <a:schemeClr val="bg1"/>
                 </a:solidFill>
@@ -5150,7 +5005,7 @@
               <a:t>Behnam </a:t>
             </a:r>
             <a:r>
-              <a:rPr lang="en-US" sz="3500" dirty="0" err="1" smtClean="0">
+              <a:rPr lang="en-US" sz="3500" dirty="0" err="1">
                 <a:solidFill>
                   <a:schemeClr val="bg1"/>
                 </a:solidFill>
@@ -5158,7 +5013,7 @@
               <a:t>Saeedi</a:t>
             </a:r>
             <a:r>
-              <a:rPr lang="en-US" sz="3500" dirty="0" smtClean="0">
+              <a:rPr lang="en-US" sz="3500" dirty="0">
                 <a:solidFill>
                   <a:schemeClr val="bg1"/>
                 </a:solidFill>
@@ -5178,15 +5033,7 @@
                   <a:schemeClr val="bg1"/>
                 </a:solidFill>
               </a:rPr>
-              <a:t>  </a:t>
-            </a:r>
-            <a:r>
-              <a:rPr lang="en-US" sz="3000" dirty="0" smtClean="0">
-                <a:solidFill>
-                  <a:schemeClr val="bg1"/>
-                </a:solidFill>
-              </a:rPr>
-              <a:t>   Computer Science Systems</a:t>
+              <a:t>     Computer Science Systems</a:t>
             </a:r>
           </a:p>
           <a:p>
@@ -5201,18 +5048,10 @@
                   <a:schemeClr val="bg1"/>
                 </a:solidFill>
               </a:rPr>
-              <a:t> </a:t>
-            </a:r>
-            <a:r>
-              <a:rPr lang="en-US" sz="3000" dirty="0" smtClean="0">
-                <a:solidFill>
-                  <a:schemeClr val="bg1"/>
-                </a:solidFill>
-              </a:rPr>
-              <a:t>   (</a:t>
-            </a:r>
-            <a:r>
-              <a:rPr lang="en-US" sz="3000" dirty="0" err="1" smtClean="0">
+              <a:t>    (</a:t>
+            </a:r>
+            <a:r>
+              <a:rPr lang="en-US" sz="3000" dirty="0" err="1">
                 <a:solidFill>
                   <a:schemeClr val="bg1"/>
                 </a:solidFill>
@@ -5220,186 +5059,13 @@
               <a:t>saeedib@oregonstate.edu</a:t>
             </a:r>
             <a:r>
-              <a:rPr lang="en-US" sz="3000" dirty="0" smtClean="0">
+              <a:rPr lang="en-US" sz="3000" dirty="0">
                 <a:solidFill>
                   <a:schemeClr val="bg1"/>
                 </a:solidFill>
               </a:rPr>
               <a:t>)</a:t>
             </a:r>
-          </a:p>
-          <a:p>
-            <a:pPr>
-              <a:spcAft>
-                <a:spcPts val="1800"/>
-              </a:spcAft>
-            </a:pPr>
-            <a:endParaRPr lang="en-US" sz="3000" dirty="0" smtClean="0">
-              <a:solidFill>
-                <a:schemeClr val="bg1"/>
-              </a:solidFill>
-            </a:endParaRPr>
-          </a:p>
-          <a:p>
-            <a:pPr marL="457200" indent="-457200">
-              <a:spcAft>
-                <a:spcPts val="1800"/>
-              </a:spcAft>
-              <a:buFont typeface="Arial"/>
-              <a:buChar char="•"/>
-            </a:pPr>
-            <a:r>
-              <a:rPr lang="en-US" sz="3500" dirty="0" smtClean="0">
-                <a:solidFill>
-                  <a:schemeClr val="bg1"/>
-                </a:solidFill>
-              </a:rPr>
-              <a:t>Collin Dorsett </a:t>
-            </a:r>
-          </a:p>
-          <a:p>
-            <a:pPr>
-              <a:spcAft>
-                <a:spcPts val="1800"/>
-              </a:spcAft>
-            </a:pPr>
-            <a:r>
-              <a:rPr lang="en-US" sz="3500" dirty="0" smtClean="0">
-                <a:solidFill>
-                  <a:schemeClr val="bg1"/>
-                </a:solidFill>
-              </a:rPr>
-              <a:t>    </a:t>
-            </a:r>
-            <a:r>
-              <a:rPr lang="en-US" sz="3000" dirty="0" smtClean="0">
-                <a:solidFill>
-                  <a:schemeClr val="bg1"/>
-                </a:solidFill>
-              </a:rPr>
-              <a:t>Computer Science Systems</a:t>
-            </a:r>
-            <a:endParaRPr lang="en-US" sz="3000" dirty="0">
-              <a:solidFill>
-                <a:schemeClr val="bg1"/>
-              </a:solidFill>
-            </a:endParaRPr>
-          </a:p>
-          <a:p>
-            <a:pPr>
-              <a:spcAft>
-                <a:spcPts val="1800"/>
-              </a:spcAft>
-            </a:pPr>
-            <a:r>
-              <a:rPr lang="en-US" sz="3000" dirty="0" smtClean="0">
-                <a:solidFill>
-                  <a:schemeClr val="bg1"/>
-                </a:solidFill>
-              </a:rPr>
-              <a:t>    (</a:t>
-            </a:r>
-            <a:r>
-              <a:rPr lang="en-US" sz="3000" dirty="0" err="1" smtClean="0">
-                <a:solidFill>
-                  <a:schemeClr val="bg1"/>
-                </a:solidFill>
-              </a:rPr>
-              <a:t>dorsettc@oregonstate.edu</a:t>
-            </a:r>
-            <a:r>
-              <a:rPr lang="en-US" sz="3000" dirty="0" smtClean="0">
-                <a:solidFill>
-                  <a:schemeClr val="bg1"/>
-                </a:solidFill>
-              </a:rPr>
-              <a:t>)</a:t>
-            </a:r>
-          </a:p>
-          <a:p>
-            <a:pPr>
-              <a:spcAft>
-                <a:spcPts val="1800"/>
-              </a:spcAft>
-            </a:pPr>
-            <a:endParaRPr lang="en-US" sz="3000" dirty="0" smtClean="0">
-              <a:solidFill>
-                <a:schemeClr val="bg1"/>
-              </a:solidFill>
-            </a:endParaRPr>
-          </a:p>
-          <a:p>
-            <a:pPr>
-              <a:spcAft>
-                <a:spcPts val="1800"/>
-              </a:spcAft>
-            </a:pPr>
-            <a:r>
-              <a:rPr lang="en-US" sz="3600" b="1" dirty="0" smtClean="0">
-                <a:solidFill>
-                  <a:srgbClr val="F37321"/>
-                </a:solidFill>
-              </a:rPr>
-              <a:t>Client: </a:t>
-            </a:r>
-          </a:p>
-          <a:p>
-            <a:pPr marL="457200" indent="-457200">
-              <a:spcAft>
-                <a:spcPts val="1800"/>
-              </a:spcAft>
-              <a:buFont typeface="Arial" charset="0"/>
-              <a:buChar char="•"/>
-            </a:pPr>
-            <a:r>
-              <a:rPr lang="en-US" sz="3000" dirty="0" smtClean="0">
-                <a:solidFill>
-                  <a:schemeClr val="bg1"/>
-                </a:solidFill>
-              </a:rPr>
-              <a:t>Professor Fuxin Li</a:t>
-            </a:r>
-            <a:r>
-              <a:rPr lang="en-US" sz="3000" dirty="0" smtClean="0">
-                <a:solidFill>
-                  <a:schemeClr val="bg1"/>
-                </a:solidFill>
-              </a:rPr>
-              <a:t> </a:t>
-            </a:r>
-            <a:endParaRPr lang="en-US" sz="3000" dirty="0" smtClean="0">
-              <a:solidFill>
-                <a:schemeClr val="bg1"/>
-              </a:solidFill>
-            </a:endParaRPr>
-          </a:p>
-          <a:p>
-            <a:pPr>
-              <a:spcAft>
-                <a:spcPts val="1800"/>
-              </a:spcAft>
-            </a:pPr>
-            <a:r>
-              <a:rPr lang="en-US" sz="3000" dirty="0">
-                <a:solidFill>
-                  <a:schemeClr val="bg1"/>
-                </a:solidFill>
-              </a:rPr>
-              <a:t> </a:t>
-            </a:r>
-            <a:r>
-              <a:rPr lang="en-US" sz="3000" dirty="0" smtClean="0">
-                <a:solidFill>
-                  <a:schemeClr val="bg1"/>
-                </a:solidFill>
-              </a:rPr>
-              <a:t>   Oregon State University</a:t>
-            </a:r>
-            <a:endParaRPr lang="en-US" sz="3000" dirty="0" smtClean="0">
-              <a:solidFill>
-                <a:schemeClr val="bg1"/>
-              </a:solidFill>
-            </a:endParaRPr>
           </a:p>
           <a:p>
             <a:pPr>
@@ -5413,38 +5079,240 @@
               </a:solidFill>
             </a:endParaRPr>
           </a:p>
-        </p:txBody>
-      </p:sp>
-      <p:pic>
-        <p:nvPicPr>
-          <p:cNvPr id="4" name="Picture 3"/>
-          <p:cNvPicPr>
-            <a:picLocks noChangeAspect="1"/>
-          </p:cNvPicPr>
-          <p:nvPr/>
-        </p:nvPicPr>
-        <p:blipFill>
-          <a:blip r:embed="rId3">
-            <a:extLst>
-              <a:ext uri="{28A0092B-C50C-407E-A947-70E740481C1C}">
-                <a14:useLocalDpi xmlns:a14="http://schemas.microsoft.com/office/drawing/2010/main" val="0"/>
-              </a:ext>
-            </a:extLst>
-          </a:blip>
-          <a:stretch>
-            <a:fillRect/>
-          </a:stretch>
-        </p:blipFill>
-        <p:spPr>
-          <a:xfrm>
-            <a:off x="28452369" y="3191747"/>
-            <a:ext cx="2540000" cy="2540000"/>
-          </a:xfrm>
-          <a:prstGeom prst="rect">
-            <a:avLst/>
-          </a:prstGeom>
-        </p:spPr>
-      </p:pic>
+          <a:p>
+            <a:pPr marL="457200" indent="-457200">
+              <a:spcAft>
+                <a:spcPts val="1800"/>
+              </a:spcAft>
+              <a:buFont typeface="Arial"/>
+              <a:buChar char="•"/>
+            </a:pPr>
+            <a:r>
+              <a:rPr lang="en-US" sz="3500" dirty="0">
+                <a:solidFill>
+                  <a:schemeClr val="bg1"/>
+                </a:solidFill>
+              </a:rPr>
+              <a:t>Collin Dorsett </a:t>
+            </a:r>
+          </a:p>
+          <a:p>
+            <a:pPr>
+              <a:spcAft>
+                <a:spcPts val="1800"/>
+              </a:spcAft>
+            </a:pPr>
+            <a:r>
+              <a:rPr lang="en-US" sz="3500" dirty="0">
+                <a:solidFill>
+                  <a:schemeClr val="bg1"/>
+                </a:solidFill>
+              </a:rPr>
+              <a:t>    </a:t>
+            </a:r>
+            <a:r>
+              <a:rPr lang="en-US" sz="3000" dirty="0">
+                <a:solidFill>
+                  <a:schemeClr val="bg1"/>
+                </a:solidFill>
+              </a:rPr>
+              <a:t>Computer Science Systems</a:t>
+            </a:r>
+          </a:p>
+          <a:p>
+            <a:pPr>
+              <a:spcAft>
+                <a:spcPts val="1800"/>
+              </a:spcAft>
+            </a:pPr>
+            <a:r>
+              <a:rPr lang="en-US" sz="3000" dirty="0">
+                <a:solidFill>
+                  <a:schemeClr val="bg1"/>
+                </a:solidFill>
+              </a:rPr>
+              <a:t>    (</a:t>
+            </a:r>
+            <a:r>
+              <a:rPr lang="en-US" sz="3000" dirty="0" err="1">
+                <a:solidFill>
+                  <a:schemeClr val="bg1"/>
+                </a:solidFill>
+              </a:rPr>
+              <a:t>dorsettc@oregonstate.edu</a:t>
+            </a:r>
+            <a:r>
+              <a:rPr lang="en-US" sz="3000" dirty="0">
+                <a:solidFill>
+                  <a:schemeClr val="bg1"/>
+                </a:solidFill>
+              </a:rPr>
+              <a:t>)</a:t>
+            </a:r>
+          </a:p>
+          <a:p>
+            <a:pPr>
+              <a:spcAft>
+                <a:spcPts val="1800"/>
+              </a:spcAft>
+            </a:pPr>
+            <a:endParaRPr lang="en-US" sz="3000" dirty="0">
+              <a:solidFill>
+                <a:schemeClr val="bg1"/>
+              </a:solidFill>
+            </a:endParaRPr>
+          </a:p>
+          <a:p>
+            <a:pPr>
+              <a:spcAft>
+                <a:spcPts val="1800"/>
+              </a:spcAft>
+            </a:pPr>
+            <a:r>
+              <a:rPr lang="en-US" sz="3600" b="1" dirty="0">
+                <a:solidFill>
+                  <a:srgbClr val="F37321"/>
+                </a:solidFill>
+              </a:rPr>
+              <a:t>Client: </a:t>
+            </a:r>
+          </a:p>
+          <a:p>
+            <a:pPr marL="457200" indent="-457200">
+              <a:spcAft>
+                <a:spcPts val="1800"/>
+              </a:spcAft>
+              <a:buFont typeface="Arial" charset="0"/>
+              <a:buChar char="•"/>
+            </a:pPr>
+            <a:r>
+              <a:rPr lang="en-US" sz="3000" dirty="0">
+                <a:solidFill>
+                  <a:schemeClr val="bg1"/>
+                </a:solidFill>
+              </a:rPr>
+              <a:t>Professor Fuxin Li </a:t>
+            </a:r>
+          </a:p>
+          <a:p>
+            <a:pPr>
+              <a:spcAft>
+                <a:spcPts val="1800"/>
+              </a:spcAft>
+            </a:pPr>
+            <a:r>
+              <a:rPr lang="en-US" sz="3000" dirty="0">
+                <a:solidFill>
+                  <a:schemeClr val="bg1"/>
+                </a:solidFill>
+              </a:rPr>
+              <a:t>    Oregon State University</a:t>
+            </a:r>
+          </a:p>
+          <a:p>
+            <a:pPr>
+              <a:spcAft>
+                <a:spcPts val="1800"/>
+              </a:spcAft>
+            </a:pPr>
+            <a:endParaRPr lang="en-US" sz="3000" dirty="0">
+              <a:solidFill>
+                <a:schemeClr val="bg1"/>
+              </a:solidFill>
+            </a:endParaRPr>
+          </a:p>
+          <a:p>
+            <a:pPr>
+              <a:spcAft>
+                <a:spcPts val="1800"/>
+              </a:spcAft>
+            </a:pPr>
+            <a:endParaRPr lang="en-US" sz="3000" dirty="0">
+              <a:solidFill>
+                <a:schemeClr val="bg1"/>
+              </a:solidFill>
+            </a:endParaRPr>
+          </a:p>
+          <a:p>
+            <a:pPr>
+              <a:spcAft>
+                <a:spcPts val="1800"/>
+              </a:spcAft>
+            </a:pPr>
+            <a:r>
+              <a:rPr lang="en-US" sz="3600" b="1" dirty="0">
+                <a:solidFill>
+                  <a:srgbClr val="F37321"/>
+                </a:solidFill>
+              </a:rPr>
+              <a:t>References:</a:t>
+            </a:r>
+          </a:p>
+          <a:p>
+            <a:pPr>
+              <a:spcAft>
+                <a:spcPts val="1800"/>
+              </a:spcAft>
+            </a:pPr>
+            <a:r>
+              <a:rPr lang="en-US" sz="3200" dirty="0">
+                <a:solidFill>
+                  <a:schemeClr val="bg1"/>
+                </a:solidFill>
+              </a:rPr>
+              <a:t>Dean, Jeff. "Large-scale deep learning for intelligent computer systems." </a:t>
+            </a:r>
+            <a:r>
+              <a:rPr lang="en-US" sz="3200" i="1" dirty="0" err="1">
+                <a:solidFill>
+                  <a:schemeClr val="bg1"/>
+                </a:solidFill>
+              </a:rPr>
+              <a:t>BayLearn</a:t>
+            </a:r>
+            <a:r>
+              <a:rPr lang="en-US" sz="3200" i="1" dirty="0">
+                <a:solidFill>
+                  <a:schemeClr val="bg1"/>
+                </a:solidFill>
+              </a:rPr>
+              <a:t> keynote speech</a:t>
+            </a:r>
+            <a:r>
+              <a:rPr lang="en-US" sz="3200" dirty="0">
+                <a:solidFill>
+                  <a:schemeClr val="bg1"/>
+                </a:solidFill>
+              </a:rPr>
+              <a:t> (2015).</a:t>
+            </a:r>
+          </a:p>
+          <a:p>
+            <a:pPr>
+              <a:spcAft>
+                <a:spcPts val="1800"/>
+              </a:spcAft>
+            </a:pPr>
+            <a:endParaRPr lang="en-US" sz="3000" dirty="0">
+              <a:solidFill>
+                <a:schemeClr val="bg1"/>
+              </a:solidFill>
+            </a:endParaRPr>
+          </a:p>
+          <a:p>
+            <a:pPr>
+              <a:spcAft>
+                <a:spcPts val="1800"/>
+              </a:spcAft>
+            </a:pPr>
+            <a:endParaRPr lang="en-US" sz="3000" dirty="0">
+              <a:solidFill>
+                <a:schemeClr val="bg1"/>
+              </a:solidFill>
+            </a:endParaRPr>
+          </a:p>
+        </p:txBody>
+      </p:sp>
       <p:pic>
         <p:nvPicPr>
           <p:cNvPr id="5" name="Picture 4"/>
@@ -5467,8 +5335,8 @@
         </p:blipFill>
         <p:spPr>
           <a:xfrm>
-            <a:off x="21881043" y="16594133"/>
-            <a:ext cx="9857197" cy="7772400"/>
+            <a:off x="23757376" y="5865961"/>
+            <a:ext cx="8300618" cy="6545037"/>
           </a:xfrm>
           <a:prstGeom prst="rect">
             <a:avLst/>
@@ -5477,7 +5345,7 @@
       </p:pic>
       <p:pic>
         <p:nvPicPr>
-          <p:cNvPr id="7" name="Picture 6"/>
+          <p:cNvPr id="8" name="Picture 7"/>
           <p:cNvPicPr>
             <a:picLocks noChangeAspect="1"/>
           </p:cNvPicPr>
@@ -5497,8 +5365,8 @@
         </p:blipFill>
         <p:spPr>
           <a:xfrm>
-            <a:off x="11830454" y="6505109"/>
-            <a:ext cx="10114548" cy="4618977"/>
+            <a:off x="39780620" y="20633614"/>
+            <a:ext cx="2540000" cy="2540000"/>
           </a:xfrm>
           <a:prstGeom prst="rect">
             <a:avLst/>
@@ -5507,28 +5375,22 @@
       </p:pic>
       <p:pic>
         <p:nvPicPr>
-          <p:cNvPr id="8" name="Picture 7"/>
+          <p:cNvPr id="10" name="Picture 9"/>
           <p:cNvPicPr>
             <a:picLocks noChangeAspect="1"/>
           </p:cNvPicPr>
           <p:nvPr/>
         </p:nvPicPr>
         <p:blipFill>
-          <a:blip r:embed="rId6">
-            <a:extLst>
-              <a:ext uri="{28A0092B-C50C-407E-A947-70E740481C1C}">
-                <a14:useLocalDpi xmlns:a14="http://schemas.microsoft.com/office/drawing/2010/main" val="0"/>
-              </a:ext>
-            </a:extLst>
-          </a:blip>
+          <a:blip r:embed="rId6"/>
           <a:stretch>
             <a:fillRect/>
           </a:stretch>
         </p:blipFill>
         <p:spPr>
           <a:xfrm>
-            <a:off x="35187558" y="24294259"/>
-            <a:ext cx="2540000" cy="2540000"/>
+            <a:off x="11771675" y="6815922"/>
+            <a:ext cx="9839530" cy="5417089"/>
           </a:xfrm>
           <a:prstGeom prst="rect">
             <a:avLst/>
@@ -5537,14 +5399,186 @@
       </p:pic>
       <p:sp>
         <p:nvSpPr>
-          <p:cNvPr id="9" name="TextBox 8"/>
+          <p:cNvPr id="11" name="Arrow: Right 10"/>
+          <p:cNvSpPr/>
+          <p:nvPr/>
+        </p:nvSpPr>
+        <p:spPr>
+          <a:xfrm>
+            <a:off x="21874806" y="9236998"/>
+            <a:ext cx="1763486" cy="1028848"/>
+          </a:xfrm>
+          <a:prstGeom prst="rightArrow">
+            <a:avLst/>
+          </a:prstGeom>
+          <a:solidFill>
+            <a:schemeClr val="accent6"/>
+          </a:solidFill>
+          <a:ln>
+            <a:solidFill>
+              <a:schemeClr val="accent6">
+                <a:lumMod val="75000"/>
+              </a:schemeClr>
+            </a:solidFill>
+          </a:ln>
+        </p:spPr>
+        <p:style>
+          <a:lnRef idx="1">
+            <a:schemeClr val="accent1"/>
+          </a:lnRef>
+          <a:fillRef idx="3">
+            <a:schemeClr val="accent1"/>
+          </a:fillRef>
+          <a:effectRef idx="2">
+            <a:schemeClr val="accent1"/>
+          </a:effectRef>
+          <a:fontRef idx="minor">
+            <a:schemeClr val="lt1"/>
+          </a:fontRef>
+        </p:style>
+        <p:txBody>
+          <a:bodyPr rtlCol="0" anchor="ctr"/>
+          <a:lstStyle/>
+          <a:p>
+            <a:pPr algn="ctr"/>
+            <a:endParaRPr lang="en-US" dirty="0"/>
+          </a:p>
+        </p:txBody>
+      </p:sp>
+      <p:grpSp>
+        <p:nvGrpSpPr>
+          <p:cNvPr id="19" name="Group 18"/>
+          <p:cNvGrpSpPr/>
+          <p:nvPr/>
+        </p:nvGrpSpPr>
+        <p:grpSpPr>
+          <a:xfrm>
+            <a:off x="12708131" y="14851253"/>
+            <a:ext cx="7805797" cy="11223039"/>
+            <a:chOff x="23784162" y="13071220"/>
+            <a:chExt cx="7805797" cy="11223039"/>
+          </a:xfrm>
+        </p:grpSpPr>
+        <p:pic>
+          <p:nvPicPr>
+            <p:cNvPr id="4" name="Picture 3"/>
+            <p:cNvPicPr>
+              <a:picLocks noChangeAspect="1"/>
+            </p:cNvPicPr>
+            <p:nvPr/>
+          </p:nvPicPr>
+          <p:blipFill>
+            <a:blip r:embed="rId7">
+              <a:extLst>
+                <a:ext uri="{28A0092B-C50C-407E-A947-70E740481C1C}">
+                  <a14:useLocalDpi xmlns:a14="http://schemas.microsoft.com/office/drawing/2010/main" val="0"/>
+                </a:ext>
+              </a:extLst>
+            </a:blip>
+            <a:stretch>
+              <a:fillRect/>
+            </a:stretch>
+          </p:blipFill>
+          <p:spPr>
+            <a:xfrm>
+              <a:off x="26417061" y="21754259"/>
+              <a:ext cx="2540000" cy="2540000"/>
+            </a:xfrm>
+            <a:prstGeom prst="rect">
+              <a:avLst/>
+            </a:prstGeom>
+          </p:spPr>
+        </p:pic>
+        <p:sp>
+          <p:nvSpPr>
+            <p:cNvPr id="18" name="TextBox 17"/>
+            <p:cNvSpPr txBox="1"/>
+            <p:nvPr/>
+          </p:nvSpPr>
+          <p:spPr>
+            <a:xfrm>
+              <a:off x="23784162" y="13071220"/>
+              <a:ext cx="7805797" cy="10095071"/>
+            </a:xfrm>
+            <a:prstGeom prst="rect">
+              <a:avLst/>
+            </a:prstGeom>
+            <a:noFill/>
+          </p:spPr>
+          <p:txBody>
+            <a:bodyPr wrap="square" rtlCol="0">
+              <a:spAutoFit/>
+            </a:bodyPr>
+            <a:lstStyle/>
+            <a:p>
+              <a:pPr>
+                <a:spcAft>
+                  <a:spcPts val="1800"/>
+                </a:spcAft>
+              </a:pPr>
+              <a:r>
+                <a:rPr lang="en-US" sz="3600" b="1" dirty="0">
+                  <a:solidFill>
+                    <a:srgbClr val="5D87A1"/>
+                  </a:solidFill>
+                </a:rPr>
+                <a:t>How are we trying to solve the issue?</a:t>
+              </a:r>
+            </a:p>
+            <a:p>
+              <a:pPr>
+                <a:spcAft>
+                  <a:spcPts val="1800"/>
+                </a:spcAft>
+              </a:pPr>
+              <a:r>
+                <a:rPr lang="en-US" sz="3600" dirty="0"/>
+                <a:t>We are trying to implement a new way of programming. We are trying to abstract away the text-based programming environment to shift the attention of the programmer from syntax to development of functionality, making it easier for them to focus on studying their design.</a:t>
+              </a:r>
+            </a:p>
+            <a:p>
+              <a:pPr>
+                <a:spcAft>
+                  <a:spcPts val="1800"/>
+                </a:spcAft>
+              </a:pPr>
+              <a:endParaRPr lang="en-US" sz="3600" b="1" dirty="0">
+                <a:solidFill>
+                  <a:srgbClr val="5D87A1"/>
+                </a:solidFill>
+              </a:endParaRPr>
+            </a:p>
+            <a:p>
+              <a:pPr algn="ctr">
+                <a:spcAft>
+                  <a:spcPts val="1800"/>
+                </a:spcAft>
+              </a:pPr>
+              <a:r>
+                <a:rPr lang="en-US" sz="3600" b="1" dirty="0">
+                  <a:solidFill>
+                    <a:srgbClr val="5D87A1"/>
+                  </a:solidFill>
+                </a:rPr>
+                <a:t>Learn more about our project at our website here:</a:t>
+              </a:r>
+            </a:p>
+            <a:p>
+              <a:endParaRPr lang="en-US" dirty="0"/>
+            </a:p>
+          </p:txBody>
+        </p:sp>
+      </p:grpSp>
+      <p:sp>
+        <p:nvSpPr>
+          <p:cNvPr id="20" name="TextBox 19"/>
           <p:cNvSpPr txBox="1"/>
           <p:nvPr/>
         </p:nvSpPr>
         <p:spPr>
           <a:xfrm>
-            <a:off x="12469125" y="11330609"/>
-            <a:ext cx="9143999" cy="461665"/>
+            <a:off x="25679393" y="4942631"/>
+            <a:ext cx="6378601" cy="923330"/>
           </a:xfrm>
           <a:prstGeom prst="rect">
             <a:avLst/>
@@ -5558,24 +5592,71 @@
           <a:lstStyle/>
           <a:p>
             <a:r>
-              <a:rPr lang="en-US" sz="1200" dirty="0"/>
-              <a:t>Dean, Jeff. "Large-scale deep learning for intelligent computer systems." </a:t>
-            </a:r>
-            <a:r>
-              <a:rPr lang="en-US" sz="1200" i="1" dirty="0" err="1"/>
-              <a:t>BayLearn</a:t>
-            </a:r>
-            <a:r>
-              <a:rPr lang="en-US" sz="1200" i="1" dirty="0"/>
-              <a:t> keynote speech</a:t>
-            </a:r>
-            <a:r>
-              <a:rPr lang="en-US" sz="1200" dirty="0"/>
-              <a:t> (2015).</a:t>
-            </a:r>
-          </a:p>
-          <a:p>
-            <a:endParaRPr lang="en-US" sz="1200" dirty="0"/>
+              <a:rPr lang="en-US" sz="5400" dirty="0">
+                <a:solidFill>
+                  <a:srgbClr val="F37321"/>
+                </a:solidFill>
+              </a:rPr>
+              <a:t>Current State</a:t>
+            </a:r>
+          </a:p>
+        </p:txBody>
+      </p:sp>
+      <p:sp>
+        <p:nvSpPr>
+          <p:cNvPr id="27" name="TextBox 26"/>
+          <p:cNvSpPr txBox="1"/>
+          <p:nvPr/>
+        </p:nvSpPr>
+        <p:spPr>
+          <a:xfrm>
+            <a:off x="12404977" y="12263166"/>
+            <a:ext cx="9206228" cy="584775"/>
+          </a:xfrm>
+          <a:prstGeom prst="rect">
+            <a:avLst/>
+          </a:prstGeom>
+          <a:noFill/>
+        </p:spPr>
+        <p:txBody>
+          <a:bodyPr wrap="square" rtlCol="0">
+            <a:spAutoFit/>
+          </a:bodyPr>
+          <a:lstStyle/>
+          <a:p>
+            <a:r>
+              <a:rPr lang="en-US" sz="3200" dirty="0"/>
+              <a:t>Figure 2: Our early prototype mock-up</a:t>
+            </a:r>
+          </a:p>
+        </p:txBody>
+      </p:sp>
+      <p:sp>
+        <p:nvSpPr>
+          <p:cNvPr id="32" name="TextBox 31"/>
+          <p:cNvSpPr txBox="1"/>
+          <p:nvPr/>
+        </p:nvSpPr>
+        <p:spPr>
+          <a:xfrm>
+            <a:off x="23915102" y="12368069"/>
+            <a:ext cx="8060884" cy="1077218"/>
+          </a:xfrm>
+          <a:prstGeom prst="rect">
+            <a:avLst/>
+          </a:prstGeom>
+          <a:noFill/>
+        </p:spPr>
+        <p:txBody>
+          <a:bodyPr wrap="square" rtlCol="0">
+            <a:spAutoFit/>
+          </a:bodyPr>
+          <a:lstStyle/>
+          <a:p>
+            <a:r>
+              <a:rPr lang="en-US" sz="3200" dirty="0"/>
+              <a:t>Figure 3: Our current GUI showing the flow of an algorithm</a:t>
+            </a:r>
           </a:p>
         </p:txBody>
       </p:sp>
@@ -5589,13 +5670,6 @@
   <p:clrMapOvr>
     <a:masterClrMapping/>
   </p:clrMapOvr>
-  <p:timing>
-    <p:tnLst>
-      <p:par>
-        <p:cTn id="1" dur="indefinite" restart="never" nodeType="tmRoot"/>
-      </p:par>
-    </p:tnLst>
-  </p:timing>
 </p:sld>
 </file>
 

</xml_diff>